<commit_message>
Updated title in slidedeck
</commit_message>
<xml_diff>
--- a/Predicting Breast Cancer Diagnosis.pptx
+++ b/Predicting Breast Cancer Diagnosis.pptx
@@ -4601,12 +4601,12 @@
           <a:lstStyle/>
           <a:p>
             <a:r>
-              <a:rPr lang="en-US" dirty="0" err="1"/>
-              <a:t>XGBoost</a:t>
+              <a:rPr lang="en-US"/>
+              <a:t>XGBClassifier </a:t>
             </a:r>
             <a:r>
               <a:rPr lang="en-US" dirty="0"/>
-              <a:t> Most Favorable for Breast Cancer Diagnosis</a:t>
+              <a:t>Most Favorable for Breast Cancer Diagnosis</a:t>
             </a:r>
           </a:p>
         </p:txBody>

</xml_diff>

<commit_message>
Updated metrics to include precision-recall score
</commit_message>
<xml_diff>
--- a/Predicting Breast Cancer Diagnosis.pptx
+++ b/Predicting Breast Cancer Diagnosis.pptx
@@ -211,7 +211,7 @@
           <a:p>
             <a:fld id="{E5A4AE57-59F3-48A4-AC1D-104A40639150}" type="datetimeFigureOut">
               <a:rPr lang="en-US" smtClean="0"/>
-              <a:t>9/17/2020</a:t>
+              <a:t>9/21/2020</a:t>
             </a:fld>
             <a:endParaRPr lang="en-US"/>
           </a:p>
@@ -1512,7 +1512,7 @@
           <a:p>
             <a:fld id="{3926AA01-1CCA-4B0B-87E8-B3C01B2A8272}" type="datetimeFigureOut">
               <a:rPr lang="en-US" smtClean="0"/>
-              <a:t>9/17/2020</a:t>
+              <a:t>9/21/2020</a:t>
             </a:fld>
             <a:endParaRPr lang="en-US"/>
           </a:p>
@@ -1710,7 +1710,7 @@
           <a:p>
             <a:fld id="{3926AA01-1CCA-4B0B-87E8-B3C01B2A8272}" type="datetimeFigureOut">
               <a:rPr lang="en-US" smtClean="0"/>
-              <a:t>9/17/2020</a:t>
+              <a:t>9/21/2020</a:t>
             </a:fld>
             <a:endParaRPr lang="en-US"/>
           </a:p>
@@ -1918,7 +1918,7 @@
           <a:p>
             <a:fld id="{3926AA01-1CCA-4B0B-87E8-B3C01B2A8272}" type="datetimeFigureOut">
               <a:rPr lang="en-US" smtClean="0"/>
-              <a:t>9/17/2020</a:t>
+              <a:t>9/21/2020</a:t>
             </a:fld>
             <a:endParaRPr lang="en-US"/>
           </a:p>
@@ -2116,7 +2116,7 @@
           <a:p>
             <a:fld id="{3926AA01-1CCA-4B0B-87E8-B3C01B2A8272}" type="datetimeFigureOut">
               <a:rPr lang="en-US" smtClean="0"/>
-              <a:t>9/17/2020</a:t>
+              <a:t>9/21/2020</a:t>
             </a:fld>
             <a:endParaRPr lang="en-US"/>
           </a:p>
@@ -2391,7 +2391,7 @@
           <a:p>
             <a:fld id="{3926AA01-1CCA-4B0B-87E8-B3C01B2A8272}" type="datetimeFigureOut">
               <a:rPr lang="en-US" smtClean="0"/>
-              <a:t>9/17/2020</a:t>
+              <a:t>9/21/2020</a:t>
             </a:fld>
             <a:endParaRPr lang="en-US"/>
           </a:p>
@@ -2656,7 +2656,7 @@
           <a:p>
             <a:fld id="{3926AA01-1CCA-4B0B-87E8-B3C01B2A8272}" type="datetimeFigureOut">
               <a:rPr lang="en-US" smtClean="0"/>
-              <a:t>9/17/2020</a:t>
+              <a:t>9/21/2020</a:t>
             </a:fld>
             <a:endParaRPr lang="en-US"/>
           </a:p>
@@ -3068,7 +3068,7 @@
           <a:p>
             <a:fld id="{3926AA01-1CCA-4B0B-87E8-B3C01B2A8272}" type="datetimeFigureOut">
               <a:rPr lang="en-US" smtClean="0"/>
-              <a:t>9/17/2020</a:t>
+              <a:t>9/21/2020</a:t>
             </a:fld>
             <a:endParaRPr lang="en-US"/>
           </a:p>
@@ -3209,7 +3209,7 @@
           <a:p>
             <a:fld id="{3926AA01-1CCA-4B0B-87E8-B3C01B2A8272}" type="datetimeFigureOut">
               <a:rPr lang="en-US" smtClean="0"/>
-              <a:t>9/17/2020</a:t>
+              <a:t>9/21/2020</a:t>
             </a:fld>
             <a:endParaRPr lang="en-US"/>
           </a:p>
@@ -3322,7 +3322,7 @@
           <a:p>
             <a:fld id="{3926AA01-1CCA-4B0B-87E8-B3C01B2A8272}" type="datetimeFigureOut">
               <a:rPr lang="en-US" smtClean="0"/>
-              <a:t>9/17/2020</a:t>
+              <a:t>9/21/2020</a:t>
             </a:fld>
             <a:endParaRPr lang="en-US"/>
           </a:p>
@@ -3633,7 +3633,7 @@
           <a:p>
             <a:fld id="{3926AA01-1CCA-4B0B-87E8-B3C01B2A8272}" type="datetimeFigureOut">
               <a:rPr lang="en-US" smtClean="0"/>
-              <a:t>9/17/2020</a:t>
+              <a:t>9/21/2020</a:t>
             </a:fld>
             <a:endParaRPr lang="en-US"/>
           </a:p>
@@ -3921,7 +3921,7 @@
           <a:p>
             <a:fld id="{3926AA01-1CCA-4B0B-87E8-B3C01B2A8272}" type="datetimeFigureOut">
               <a:rPr lang="en-US" smtClean="0"/>
-              <a:t>9/17/2020</a:t>
+              <a:t>9/21/2020</a:t>
             </a:fld>
             <a:endParaRPr lang="en-US"/>
           </a:p>
@@ -4162,7 +4162,7 @@
           <a:p>
             <a:fld id="{3926AA01-1CCA-4B0B-87E8-B3C01B2A8272}" type="datetimeFigureOut">
               <a:rPr lang="en-US" smtClean="0"/>
-              <a:t>9/17/2020</a:t>
+              <a:t>9/21/2020</a:t>
             </a:fld>
             <a:endParaRPr lang="en-US"/>
           </a:p>
@@ -4601,12 +4601,12 @@
           <a:lstStyle/>
           <a:p>
             <a:r>
-              <a:rPr lang="en-US"/>
-              <a:t>XGBClassifier </a:t>
+              <a:rPr lang="en-US" dirty="0" err="1"/>
+              <a:t>XGBClassifier</a:t>
             </a:r>
             <a:r>
               <a:rPr lang="en-US" dirty="0"/>
-              <a:t>Most Favorable for Breast Cancer Diagnosis</a:t>
+              <a:t> Most Favorable for Breast Cancer Diagnosis</a:t>
             </a:r>
           </a:p>
         </p:txBody>
@@ -4866,7 +4866,7 @@
           <a:p>
             <a:r>
               <a:rPr lang="en-US" dirty="0"/>
-              <a:t>K Nearest Neighbors (KNN): Good accuracy, poor recall</a:t>
+              <a:t>Random Forest: good accuracy, bad recall</a:t>
             </a:r>
           </a:p>
         </p:txBody>
@@ -4894,7 +4894,7 @@
           <a:p>
             <a:r>
               <a:rPr lang="en-US" dirty="0"/>
-              <a:t>Accuracy: 96%</a:t>
+              <a:t>AUPRC: 0.9395</a:t>
             </a:r>
           </a:p>
           <a:p>
@@ -4903,7 +4903,7 @@
           <a:p>
             <a:r>
               <a:rPr lang="en-US" dirty="0"/>
-              <a:t>Recall: 91%</a:t>
+              <a:t>Recall: 88%</a:t>
             </a:r>
           </a:p>
         </p:txBody>
@@ -4923,7 +4923,7 @@
           <p:nvPr>
             <p:extLst>
               <p:ext uri="{D42A27DB-BD31-4B8C-83A1-F6EECF244321}">
-                <p14:modId xmlns:p14="http://schemas.microsoft.com/office/powerpoint/2010/main" val="1601462884"/>
+                <p14:modId xmlns:p14="http://schemas.microsoft.com/office/powerpoint/2010/main" val="3681055353"/>
               </p:ext>
             </p:extLst>
           </p:nvPr>
@@ -5117,7 +5117,7 @@
                       <a:pPr algn="ctr"/>
                       <a:r>
                         <a:rPr lang="en-US" sz="2400" dirty="0"/>
-                        <a:t>4</a:t>
+                        <a:t>5</a:t>
                       </a:r>
                     </a:p>
                   </a:txBody>
@@ -5131,7 +5131,7 @@
                       <a:pPr algn="ctr"/>
                       <a:r>
                         <a:rPr lang="en-US" sz="2400" dirty="0"/>
-                        <a:t>38</a:t>
+                        <a:t>37</a:t>
                       </a:r>
                     </a:p>
                   </a:txBody>
@@ -5199,27 +5199,29 @@
           <a:lstStyle/>
           <a:p>
             <a:r>
+              <a:rPr lang="en-US" dirty="0" err="1"/>
+              <a:t>RandomForest</a:t>
+            </a:r>
+            <a:r>
               <a:rPr lang="en-US" dirty="0"/>
-              <a:t>KNN can still be useful </a:t>
+              <a:t> can still be useful </a:t>
             </a:r>
           </a:p>
         </p:txBody>
       </p:sp>
       <p:pic>
         <p:nvPicPr>
-          <p:cNvPr id="3074" name="Picture 2">
-            <a:extLst>
-              <a:ext uri="{FF2B5EF4-FFF2-40B4-BE49-F238E27FC236}">
-                <a16:creationId xmlns:a16="http://schemas.microsoft.com/office/drawing/2014/main" id="{722643C2-B2E8-4DC6-B9D4-16FCF5A0CD2F}"/>
+          <p:cNvPr id="1029" name="Picture 5">
+            <a:extLst>
+              <a:ext uri="{FF2B5EF4-FFF2-40B4-BE49-F238E27FC236}">
+                <a16:creationId xmlns:a16="http://schemas.microsoft.com/office/drawing/2014/main" id="{1C1697C8-06EE-4DA2-A0F0-8AD291B5B625}"/>
               </a:ext>
             </a:extLst>
           </p:cNvPr>
           <p:cNvPicPr>
-            <a:picLocks noGrp="1" noChangeAspect="1" noChangeArrowheads="1"/>
+            <a:picLocks noChangeAspect="1" noChangeArrowheads="1"/>
           </p:cNvPicPr>
-          <p:nvPr>
-            <p:ph idx="1"/>
-          </p:nvPr>
+          <p:nvPr/>
         </p:nvPicPr>
         <p:blipFill>
           <a:blip r:embed="rId2">
@@ -5236,8 +5238,8 @@
         </p:blipFill>
         <p:spPr bwMode="auto">
           <a:xfrm>
-            <a:off x="6096000" y="2217836"/>
-            <a:ext cx="4786521" cy="3447288"/>
+            <a:off x="6096000" y="2272754"/>
+            <a:ext cx="4786522" cy="3447288"/>
           </a:xfrm>
           <a:prstGeom prst="rect">
             <a:avLst/>
@@ -5256,10 +5258,10 @@
       </p:pic>
       <p:pic>
         <p:nvPicPr>
-          <p:cNvPr id="3076" name="Picture 4">
-            <a:extLst>
-              <a:ext uri="{FF2B5EF4-FFF2-40B4-BE49-F238E27FC236}">
-                <a16:creationId xmlns:a16="http://schemas.microsoft.com/office/drawing/2014/main" id="{4B702227-D1CE-474C-A339-85D810C2BC64}"/>
+          <p:cNvPr id="1031" name="Picture 7">
+            <a:extLst>
+              <a:ext uri="{FF2B5EF4-FFF2-40B4-BE49-F238E27FC236}">
+                <a16:creationId xmlns:a16="http://schemas.microsoft.com/office/drawing/2014/main" id="{ABBE2D7B-DEDC-45FE-807F-A08B825D7810}"/>
               </a:ext>
             </a:extLst>
           </p:cNvPr>
@@ -5276,13 +5278,14 @@
               </a:ext>
             </a:extLst>
           </a:blip>
+          <a:srcRect/>
           <a:stretch>
             <a:fillRect/>
           </a:stretch>
         </p:blipFill>
         <p:spPr bwMode="auto">
           <a:xfrm>
-            <a:off x="1309479" y="1948088"/>
+            <a:off x="1309478" y="2003006"/>
             <a:ext cx="3976482" cy="3986784"/>
           </a:xfrm>
           <a:prstGeom prst="rect">
@@ -7041,8 +7044,12 @@
           <a:p>
             <a:pPr algn="ctr"/>
             <a:r>
+              <a:rPr lang="en-US" sz="4000" dirty="0" err="1"/>
+              <a:t>LogisticReg</a:t>
+            </a:r>
+            <a:r>
               <a:rPr lang="en-US" sz="4000" dirty="0"/>
-              <a:t>Logistic Reg.</a:t>
+              <a:t>.</a:t>
             </a:r>
             <a:endParaRPr lang="en-US" sz="2800" dirty="0"/>
           </a:p>
@@ -7204,7 +7211,7 @@
         <p:spPr>
           <a:xfrm>
             <a:off x="7842421" y="3898242"/>
-            <a:ext cx="3071674" cy="707886"/>
+            <a:ext cx="3210590" cy="707886"/>
           </a:xfrm>
           <a:prstGeom prst="rect">
             <a:avLst/>
@@ -7232,8 +7239,8 @@
           <a:p>
             <a:pPr algn="ctr"/>
             <a:r>
-              <a:rPr lang="en-US" sz="4000" dirty="0"/>
-              <a:t>KNN</a:t>
+              <a:rPr lang="en-US" sz="4000" dirty="0" err="1"/>
+              <a:t>RandomForest</a:t>
             </a:r>
             <a:endParaRPr lang="en-US" sz="2800" dirty="0"/>
           </a:p>
@@ -8584,7 +8591,7 @@
           <a:p>
             <a:r>
               <a:rPr lang="en-US" dirty="0"/>
-              <a:t>Accuracy: 95%</a:t>
+              <a:t>AUPRC: 0.9699</a:t>
             </a:r>
           </a:p>
           <a:p>
@@ -8593,7 +8600,7 @@
           <a:p>
             <a:r>
               <a:rPr lang="en-US" dirty="0"/>
-              <a:t>Recall: 96%</a:t>
+              <a:t>Recall: 90%</a:t>
             </a:r>
           </a:p>
         </p:txBody>
@@ -8613,7 +8620,7 @@
           <p:nvPr>
             <p:extLst>
               <p:ext uri="{D42A27DB-BD31-4B8C-83A1-F6EECF244321}">
-                <p14:modId xmlns:p14="http://schemas.microsoft.com/office/powerpoint/2010/main" val="2358012568"/>
+                <p14:modId xmlns:p14="http://schemas.microsoft.com/office/powerpoint/2010/main" val="3462418621"/>
               </p:ext>
             </p:extLst>
           </p:nvPr>
@@ -8807,7 +8814,7 @@
                       <a:pPr algn="ctr"/>
                       <a:r>
                         <a:rPr lang="en-US" sz="2400" dirty="0"/>
-                        <a:t>2</a:t>
+                        <a:t>4</a:t>
                       </a:r>
                     </a:p>
                   </a:txBody>
@@ -8821,7 +8828,7 @@
                       <a:pPr algn="ctr"/>
                       <a:r>
                         <a:rPr lang="en-US" sz="2400" dirty="0"/>
-                        <a:t>40</a:t>
+                        <a:t>38</a:t>
                       </a:r>
                     </a:p>
                   </a:txBody>
@@ -9073,7 +9080,7 @@
           <a:p>
             <a:r>
               <a:rPr lang="en-US" dirty="0"/>
-              <a:t>Accuracy: 96%</a:t>
+              <a:t>AUPRC: 0.9466</a:t>
             </a:r>
           </a:p>
           <a:p>

</xml_diff>